<commit_message>
Ignore, this is an upgrade from a while back
</commit_message>
<xml_diff>
--- a/Documents/SeniorDesignRequirementsP1.pptx
+++ b/Documents/SeniorDesignRequirementsP1.pptx
@@ -206,7 +206,7 @@
             <a:fld id="{5AC5063D-32E8-6B44-B899-1C60BE1EE920}" type="datetimeFigureOut">
               <a:rPr lang="en-US" smtClean="0"/>
               <a:pPr/>
-              <a:t>9/15/15</a:t>
+              <a:t>9/17/15</a:t>
             </a:fld>
             <a:endParaRPr lang="en-US"/>
           </a:p>
@@ -948,7 +948,7 @@
             <a:fld id="{4C5E565A-2BBA-CA42-A2D4-B495352A9CB5}" type="datetimeFigureOut">
               <a:rPr lang="en-US" smtClean="0"/>
               <a:pPr/>
-              <a:t>9/15/15</a:t>
+              <a:t>9/17/15</a:t>
             </a:fld>
             <a:endParaRPr lang="en-US"/>
           </a:p>
@@ -1236,7 +1236,7 @@
             <a:fld id="{4C5E565A-2BBA-CA42-A2D4-B495352A9CB5}" type="datetimeFigureOut">
               <a:rPr lang="en-US" smtClean="0"/>
               <a:pPr/>
-              <a:t>9/15/15</a:t>
+              <a:t>9/17/15</a:t>
             </a:fld>
             <a:endParaRPr lang="en-US"/>
           </a:p>
@@ -1660,7 +1660,7 @@
             <a:fld id="{4C5E565A-2BBA-CA42-A2D4-B495352A9CB5}" type="datetimeFigureOut">
               <a:rPr lang="en-US" smtClean="0"/>
               <a:pPr/>
-              <a:t>9/15/15</a:t>
+              <a:t>9/17/15</a:t>
             </a:fld>
             <a:endParaRPr lang="en-US"/>
           </a:p>
@@ -2079,7 +2079,7 @@
             <a:fld id="{4C5E565A-2BBA-CA42-A2D4-B495352A9CB5}" type="datetimeFigureOut">
               <a:rPr lang="en-US" smtClean="0"/>
               <a:pPr/>
-              <a:t>9/15/15</a:t>
+              <a:t>9/17/15</a:t>
             </a:fld>
             <a:endParaRPr lang="en-US"/>
           </a:p>
@@ -2214,7 +2214,7 @@
             <a:fld id="{4C5E565A-2BBA-CA42-A2D4-B495352A9CB5}" type="datetimeFigureOut">
               <a:rPr lang="en-US" smtClean="0"/>
               <a:pPr/>
-              <a:t>9/15/15</a:t>
+              <a:t>9/17/15</a:t>
             </a:fld>
             <a:endParaRPr lang="en-US"/>
           </a:p>
@@ -2535,7 +2535,7 @@
             <a:fld id="{4C5E565A-2BBA-CA42-A2D4-B495352A9CB5}" type="datetimeFigureOut">
               <a:rPr lang="en-US" smtClean="0"/>
               <a:pPr/>
-              <a:t>9/15/15</a:t>
+              <a:t>9/17/15</a:t>
             </a:fld>
             <a:endParaRPr lang="en-US"/>
           </a:p>
@@ -2778,7 +2778,7 @@
             <a:fld id="{4C5E565A-2BBA-CA42-A2D4-B495352A9CB5}" type="datetimeFigureOut">
               <a:rPr lang="en-US" smtClean="0"/>
               <a:pPr/>
-              <a:t>9/15/15</a:t>
+              <a:t>9/17/15</a:t>
             </a:fld>
             <a:endParaRPr lang="en-US"/>
           </a:p>
@@ -3115,7 +3115,7 @@
             <a:fld id="{4C5E565A-2BBA-CA42-A2D4-B495352A9CB5}" type="datetimeFigureOut">
               <a:rPr lang="en-US" smtClean="0"/>
               <a:pPr/>
-              <a:t>9/15/15</a:t>
+              <a:t>9/17/15</a:t>
             </a:fld>
             <a:endParaRPr lang="en-US"/>
           </a:p>
@@ -3414,7 +3414,7 @@
             <a:fld id="{4C5E565A-2BBA-CA42-A2D4-B495352A9CB5}" type="datetimeFigureOut">
               <a:rPr lang="en-US" smtClean="0"/>
               <a:pPr/>
-              <a:t>9/15/15</a:t>
+              <a:t>9/17/15</a:t>
             </a:fld>
             <a:endParaRPr lang="en-US"/>
           </a:p>
@@ -3819,7 +3819,7 @@
             <a:fld id="{4C5E565A-2BBA-CA42-A2D4-B495352A9CB5}" type="datetimeFigureOut">
               <a:rPr lang="en-US" smtClean="0"/>
               <a:pPr/>
-              <a:t>9/15/15</a:t>
+              <a:t>9/17/15</a:t>
             </a:fld>
             <a:endParaRPr lang="en-US"/>
           </a:p>
@@ -4039,7 +4039,7 @@
             <a:fld id="{4C5E565A-2BBA-CA42-A2D4-B495352A9CB5}" type="datetimeFigureOut">
               <a:rPr lang="en-US" smtClean="0"/>
               <a:pPr/>
-              <a:t>9/15/15</a:t>
+              <a:t>9/17/15</a:t>
             </a:fld>
             <a:endParaRPr lang="en-US"/>
           </a:p>
@@ -4254,7 +4254,7 @@
             <a:fld id="{4C5E565A-2BBA-CA42-A2D4-B495352A9CB5}" type="datetimeFigureOut">
               <a:rPr lang="en-US" smtClean="0"/>
               <a:pPr/>
-              <a:t>9/15/15</a:t>
+              <a:t>9/17/15</a:t>
             </a:fld>
             <a:endParaRPr lang="en-US"/>
           </a:p>
@@ -4561,7 +4561,7 @@
             <a:fld id="{4C5E565A-2BBA-CA42-A2D4-B495352A9CB5}" type="datetimeFigureOut">
               <a:rPr lang="en-US" smtClean="0"/>
               <a:pPr/>
-              <a:t>9/15/15</a:t>
+              <a:t>9/17/15</a:t>
             </a:fld>
             <a:endParaRPr lang="en-US"/>
           </a:p>
@@ -4886,7 +4886,7 @@
             <a:fld id="{4C5E565A-2BBA-CA42-A2D4-B495352A9CB5}" type="datetimeFigureOut">
               <a:rPr lang="en-US" smtClean="0"/>
               <a:pPr/>
-              <a:t>9/15/15</a:t>
+              <a:t>9/17/15</a:t>
             </a:fld>
             <a:endParaRPr lang="en-US"/>
           </a:p>
@@ -5220,7 +5220,7 @@
             <a:fld id="{4C5E565A-2BBA-CA42-A2D4-B495352A9CB5}" type="datetimeFigureOut">
               <a:rPr lang="en-US" smtClean="0"/>
               <a:pPr/>
-              <a:t>9/15/15</a:t>
+              <a:t>9/17/15</a:t>
             </a:fld>
             <a:endParaRPr lang="en-US"/>
           </a:p>
@@ -5843,7 +5843,7 @@
             <a:fld id="{4C5E565A-2BBA-CA42-A2D4-B495352A9CB5}" type="datetimeFigureOut">
               <a:rPr lang="en-US" smtClean="0"/>
               <a:pPr/>
-              <a:t>9/15/15</a:t>
+              <a:t>9/17/15</a:t>
             </a:fld>
             <a:endParaRPr lang="en-US"/>
           </a:p>
@@ -6332,7 +6332,7 @@
             <a:fld id="{4C5E565A-2BBA-CA42-A2D4-B495352A9CB5}" type="datetimeFigureOut">
               <a:rPr lang="en-US" smtClean="0"/>
               <a:pPr/>
-              <a:t>9/15/15</a:t>
+              <a:t>9/17/15</a:t>
             </a:fld>
             <a:endParaRPr lang="en-US"/>
           </a:p>
@@ -6582,7 +6582,7 @@
             <a:fld id="{4C5E565A-2BBA-CA42-A2D4-B495352A9CB5}" type="datetimeFigureOut">
               <a:rPr lang="en-US" smtClean="0"/>
               <a:pPr/>
-              <a:t>9/15/15</a:t>
+              <a:t>9/17/15</a:t>
             </a:fld>
             <a:endParaRPr lang="en-US"/>
           </a:p>
@@ -6880,7 +6880,7 @@
             <a:fld id="{4C5E565A-2BBA-CA42-A2D4-B495352A9CB5}" type="datetimeFigureOut">
               <a:rPr lang="en-US" smtClean="0"/>
               <a:pPr/>
-              <a:t>9/15/15</a:t>
+              <a:t>9/17/15</a:t>
             </a:fld>
             <a:endParaRPr lang="en-US"/>
           </a:p>
@@ -7292,16 +7292,25 @@
             <p:ph type="ctrTitle"/>
           </p:nvPr>
         </p:nvSpPr>
-        <p:spPr/>
+        <p:spPr>
+          <a:xfrm>
+            <a:off x="3200400" y="4599224"/>
+            <a:ext cx="5458968" cy="1048684"/>
+          </a:xfrm>
+        </p:spPr>
         <p:txBody>
           <a:bodyPr>
-            <a:normAutofit/>
+            <a:normAutofit fontScale="90000"/>
           </a:bodyPr>
           <a:lstStyle/>
           <a:p>
             <a:r>
               <a:rPr lang="en-US" dirty="0" smtClean="0"/>
-              <a:t>Drop  </a:t>
+              <a:t>Drop </a:t>
+            </a:r>
+            <a:r>
+              <a:rPr lang="en-US" dirty="0" smtClean="0"/>
+              <a:t>  </a:t>
             </a:r>
             <a:r>
               <a:rPr lang="en-US" dirty="0" err="1" smtClean="0"/>
@@ -7309,7 +7318,22 @@
             </a:r>
             <a:r>
               <a:rPr lang="en-US" dirty="0" smtClean="0"/>
-              <a:t>     de</a:t>
+              <a:t>  </a:t>
+            </a:r>
+            <a:r>
+              <a:rPr lang="en-US" dirty="0" smtClean="0"/>
+              <a:t>   de</a:t>
+            </a:r>
+            <a:br>
+              <a:rPr lang="en-US" dirty="0" smtClean="0"/>
+            </a:br>
+            <a:r>
+              <a:rPr lang="en-US" sz="2000" dirty="0" smtClean="0"/>
+              <a:t/>
+            </a:r>
+            <a:r>
+              <a:rPr lang="en-US" sz="2800" dirty="0" smtClean="0"/>
+              <a:t>Requirements Presentation</a:t>
             </a:r>
             <a:endParaRPr lang="en-US" dirty="0"/>
           </a:p>
@@ -7325,28 +7349,35 @@
             <p:ph type="subTitle" idx="1"/>
           </p:nvPr>
         </p:nvSpPr>
-        <p:spPr/>
-        <p:txBody>
-          <a:bodyPr/>
-          <a:lstStyle/>
-          <a:p>
-            <a:r>
-              <a:rPr lang="en-US" dirty="0" smtClean="0"/>
+        <p:spPr>
+          <a:xfrm>
+            <a:off x="3355905" y="5879592"/>
+            <a:ext cx="5458968" cy="621792"/>
+          </a:xfrm>
+        </p:spPr>
+        <p:txBody>
+          <a:bodyPr>
+            <a:noAutofit/>
+          </a:bodyPr>
+          <a:lstStyle/>
+          <a:p>
+            <a:r>
+              <a:rPr lang="en-US" sz="1800" dirty="0" smtClean="0"/>
               <a:t>Madison McHam, Alan </a:t>
             </a:r>
             <a:r>
-              <a:rPr lang="en-US" dirty="0" err="1" smtClean="0"/>
+              <a:rPr lang="en-US" sz="1800" dirty="0" err="1" smtClean="0"/>
               <a:t>Donham</a:t>
             </a:r>
             <a:r>
-              <a:rPr lang="en-US" dirty="0" smtClean="0"/>
+              <a:rPr lang="en-US" sz="1800" dirty="0" smtClean="0"/>
               <a:t>, Shane Peters, Nick </a:t>
             </a:r>
             <a:r>
-              <a:rPr lang="en-US" dirty="0" err="1" smtClean="0"/>
+              <a:rPr lang="en-US" sz="1800" dirty="0" err="1" smtClean="0"/>
               <a:t>Levert</a:t>
             </a:r>
-            <a:endParaRPr lang="en-US" dirty="0"/>
+            <a:endParaRPr lang="en-US" sz="1800" dirty="0"/>
           </a:p>
         </p:txBody>
       </p:sp>
@@ -7366,8 +7397,8 @@
         </p:blipFill>
         <p:spPr>
           <a:xfrm>
-            <a:off x="5658002" y="4477021"/>
-            <a:ext cx="843318" cy="780592"/>
+            <a:off x="5637045" y="4599224"/>
+            <a:ext cx="631018" cy="584083"/>
           </a:xfrm>
           <a:prstGeom prst="rect">
             <a:avLst/>
@@ -8266,11 +8297,7 @@
           <a:p>
             <a:r>
               <a:rPr lang="en-US" dirty="0" smtClean="0"/>
-              <a:t>Student update final grades into the database with false information</a:t>
-            </a:r>
-            <a:r>
-              <a:rPr lang="en-US" dirty="0" smtClean="0"/>
-              <a:t> </a:t>
+              <a:t>Student update final grades into the database with false information </a:t>
             </a:r>
           </a:p>
           <a:p>
@@ -8279,20 +8306,11 @@
               <a:rPr lang="en-US" dirty="0" smtClean="0"/>
               <a:t>Also forgetting to upload their final grades</a:t>
             </a:r>
-            <a:endParaRPr lang="en-US" dirty="0" smtClean="0"/>
           </a:p>
           <a:p>
             <a:r>
               <a:rPr lang="en-US" dirty="0" smtClean="0"/>
-              <a:t>Unable to gather and store all </a:t>
-            </a:r>
-            <a:r>
-              <a:rPr lang="en-US" dirty="0" smtClean="0"/>
-              <a:t>the data collected in a way that will allow us to provide useful statistics to the user very quickly and in real time.</a:t>
-            </a:r>
-            <a:r>
-              <a:rPr lang="en-US" dirty="0" smtClean="0"/>
-              <a:t> </a:t>
+              <a:t>Unable to gather and store all the data collected in a way that will allow us to provide useful statistics to the user very quickly and in real time. </a:t>
             </a:r>
           </a:p>
           <a:p>
@@ -8307,7 +8325,6 @@
               <a:rPr lang="en-US" dirty="0" smtClean="0"/>
               <a:t>Students leaving negative comments about a teacher</a:t>
             </a:r>
-            <a:endParaRPr lang="en-US" dirty="0" smtClean="0"/>
           </a:p>
           <a:p>
             <a:pPr lvl="1"/>
@@ -8747,41 +8764,32 @@
             <a:pPr algn="ctr"/>
             <a:r>
               <a:rPr lang="en-US" sz="2400" dirty="0" smtClean="0"/>
-              <a:t>D</a:t>
+              <a:t>Develop</a:t>
             </a:r>
             <a:r>
               <a:rPr lang="en-US" sz="2400" dirty="0" smtClean="0"/>
-              <a:t>evelop the </a:t>
-            </a:r>
-            <a:r>
-              <a:rPr lang="en-US" sz="2400" dirty="0" err="1" smtClean="0"/>
-              <a:t>DropGrade</a:t>
+              <a:t> an app </a:t>
             </a:r>
             <a:r>
               <a:rPr lang="en-US" sz="2400" dirty="0" smtClean="0"/>
-              <a:t> app that will </a:t>
+              <a:t>that will</a:t>
             </a:r>
             <a:r>
               <a:rPr lang="en-US" sz="2400" dirty="0" smtClean="0"/>
-              <a:t>benefit all</a:t>
+              <a:t> be </a:t>
             </a:r>
             <a:r>
               <a:rPr lang="en-US" sz="2400" dirty="0" smtClean="0"/>
-              <a:t> The </a:t>
+              <a:t>easy to </a:t>
             </a:r>
             <a:r>
               <a:rPr lang="en-US" sz="2400" dirty="0" smtClean="0"/>
-              <a:t>University of Alabama </a:t>
+              <a:t>use and benefit </a:t>
             </a:r>
             <a:r>
               <a:rPr lang="en-US" sz="2400" dirty="0" smtClean="0"/>
-              <a:t>students and minimize the stresses of </a:t>
-            </a:r>
-            <a:r>
-              <a:rPr lang="en-US" sz="2400" dirty="0" smtClean="0"/>
-              <a:t>College</a:t>
-            </a:r>
-            <a:endParaRPr lang="en-US" sz="2400" dirty="0" smtClean="0"/>
+              <a:t>all The University of Alabama students and minimize the stresses of College</a:t>
+            </a:r>
           </a:p>
           <a:p>
             <a:endParaRPr lang="en-US" dirty="0"/>
@@ -8896,11 +8904,7 @@
             </a:pPr>
             <a:r>
               <a:rPr lang="en-US" dirty="0" smtClean="0"/>
-              <a:t>Add </a:t>
-            </a:r>
-            <a:r>
-              <a:rPr lang="en-US" dirty="0" smtClean="0"/>
-              <a:t>Course /Edit Course </a:t>
+              <a:t>Add Course /Edit Course </a:t>
             </a:r>
           </a:p>
           <a:p>
@@ -8910,11 +8914,7 @@
             </a:pPr>
             <a:r>
               <a:rPr lang="en-US" dirty="0" smtClean="0"/>
-              <a:t>Add information about your </a:t>
-            </a:r>
-            <a:r>
-              <a:rPr lang="en-US" dirty="0" smtClean="0"/>
-              <a:t>courses</a:t>
+              <a:t>Add information about your courses</a:t>
             </a:r>
           </a:p>
           <a:p>
@@ -9070,11 +9070,7 @@
           <a:p>
             <a:r>
               <a:rPr lang="en-US" dirty="0" smtClean="0"/>
-              <a:t>Use Case </a:t>
-            </a:r>
-            <a:r>
-              <a:rPr lang="en-US" dirty="0" smtClean="0"/>
-              <a:t>Diagram</a:t>
+              <a:t>Use Case Diagram</a:t>
             </a:r>
             <a:endParaRPr lang="en-US" dirty="0"/>
           </a:p>
@@ -9236,11 +9232,7 @@
           <a:p>
             <a:r>
               <a:rPr lang="en-US" dirty="0" smtClean="0"/>
-              <a:t>Activity </a:t>
-            </a:r>
-            <a:r>
-              <a:rPr lang="en-US" dirty="0" smtClean="0"/>
-              <a:t>Diagram</a:t>
+              <a:t>Activity Diagram</a:t>
             </a:r>
             <a:br>
               <a:rPr lang="en-US" dirty="0" smtClean="0"/>

</xml_diff>